<commit_message>
added images to powerpoint
</commit_message>
<xml_diff>
--- a/Catch Game/Monkey Time.pptx
+++ b/Catch Game/Monkey Time.pptx
@@ -104,6 +104,11 @@
       </a:defRPr>
     </a:lvl9pPr>
   </p:defaultTextStyle>
+  <p:extLst>
+    <p:ext uri="{EFAFB233-063F-42B5-8137-9DF3F51BA10A}">
+      <p15:sldGuideLst xmlns:p15="http://schemas.microsoft.com/office/powerpoint/2012/main"/>
+    </p:ext>
+  </p:extLst>
 </p:presentation>
 </file>
 
@@ -3342,6 +3347,114 @@
           <a:chExt cx="0" cy="0"/>
         </a:xfrm>
       </p:grpSpPr>
+      <p:pic>
+        <p:nvPicPr>
+          <p:cNvPr id="16" name="Picture 15">
+            <a:extLst>
+              <a:ext uri="{FF2B5EF4-FFF2-40B4-BE49-F238E27FC236}">
+                <a16:creationId xmlns:a16="http://schemas.microsoft.com/office/drawing/2014/main" id="{C5D746F1-6F64-4252-8968-035E49BB9696}"/>
+              </a:ext>
+            </a:extLst>
+          </p:cNvPr>
+          <p:cNvPicPr>
+            <a:picLocks noChangeAspect="1"/>
+          </p:cNvPicPr>
+          <p:nvPr/>
+        </p:nvPicPr>
+        <p:blipFill>
+          <a:blip r:embed="rId2">
+            <a:extLst>
+              <a:ext uri="{28A0092B-C50C-407E-A947-70E740481C1C}">
+                <a14:useLocalDpi xmlns:a14="http://schemas.microsoft.com/office/drawing/2010/main" val="0"/>
+              </a:ext>
+            </a:extLst>
+          </a:blip>
+          <a:stretch>
+            <a:fillRect/>
+          </a:stretch>
+        </p:blipFill>
+        <p:spPr>
+          <a:xfrm rot="21353693">
+            <a:off x="3875453" y="2583170"/>
+            <a:ext cx="2656815" cy="2601078"/>
+          </a:xfrm>
+          <a:prstGeom prst="rect">
+            <a:avLst/>
+          </a:prstGeom>
+        </p:spPr>
+      </p:pic>
+      <p:pic>
+        <p:nvPicPr>
+          <p:cNvPr id="18" name="Picture 17">
+            <a:extLst>
+              <a:ext uri="{FF2B5EF4-FFF2-40B4-BE49-F238E27FC236}">
+                <a16:creationId xmlns:a16="http://schemas.microsoft.com/office/drawing/2014/main" id="{B99B2430-B8F4-4EB0-B4CB-D2896CEA03D5}"/>
+              </a:ext>
+            </a:extLst>
+          </p:cNvPr>
+          <p:cNvPicPr>
+            <a:picLocks noChangeAspect="1"/>
+          </p:cNvPicPr>
+          <p:nvPr/>
+        </p:nvPicPr>
+        <p:blipFill>
+          <a:blip r:embed="rId3">
+            <a:extLst>
+              <a:ext uri="{28A0092B-C50C-407E-A947-70E740481C1C}">
+                <a14:useLocalDpi xmlns:a14="http://schemas.microsoft.com/office/drawing/2010/main" val="0"/>
+              </a:ext>
+            </a:extLst>
+          </a:blip>
+          <a:stretch>
+            <a:fillRect/>
+          </a:stretch>
+        </p:blipFill>
+        <p:spPr>
+          <a:xfrm rot="21353693">
+            <a:off x="7099224" y="2333655"/>
+            <a:ext cx="2297866" cy="4131998"/>
+          </a:xfrm>
+          <a:prstGeom prst="rect">
+            <a:avLst/>
+          </a:prstGeom>
+        </p:spPr>
+      </p:pic>
+      <p:pic>
+        <p:nvPicPr>
+          <p:cNvPr id="14" name="Picture 13">
+            <a:extLst>
+              <a:ext uri="{FF2B5EF4-FFF2-40B4-BE49-F238E27FC236}">
+                <a16:creationId xmlns:a16="http://schemas.microsoft.com/office/drawing/2014/main" id="{E0E01E75-8C66-4698-8D15-A93049A11185}"/>
+              </a:ext>
+            </a:extLst>
+          </p:cNvPr>
+          <p:cNvPicPr>
+            <a:picLocks noChangeAspect="1"/>
+          </p:cNvPicPr>
+          <p:nvPr/>
+        </p:nvPicPr>
+        <p:blipFill>
+          <a:blip r:embed="rId4">
+            <a:extLst>
+              <a:ext uri="{28A0092B-C50C-407E-A947-70E740481C1C}">
+                <a14:useLocalDpi xmlns:a14="http://schemas.microsoft.com/office/drawing/2010/main" val="0"/>
+              </a:ext>
+            </a:extLst>
+          </a:blip>
+          <a:stretch>
+            <a:fillRect/>
+          </a:stretch>
+        </p:blipFill>
+        <p:spPr>
+          <a:xfrm rot="21353693">
+            <a:off x="9932032" y="2836018"/>
+            <a:ext cx="1819268" cy="1676580"/>
+          </a:xfrm>
+          <a:prstGeom prst="rect">
+            <a:avLst/>
+          </a:prstGeom>
+        </p:spPr>
+      </p:pic>
       <p:sp>
         <p:nvSpPr>
           <p:cNvPr id="2" name="Title 1">
@@ -3358,12 +3471,24 @@
             <p:ph type="ctrTitle"/>
           </p:nvPr>
         </p:nvSpPr>
-        <p:spPr/>
-        <p:txBody>
-          <a:bodyPr/>
-          <a:lstStyle/>
-          <a:p>
-            <a:endParaRPr lang="en-IE"/>
+        <p:spPr>
+          <a:xfrm>
+            <a:off x="1197864" y="270681"/>
+            <a:ext cx="9796272" cy="2387600"/>
+          </a:xfrm>
+        </p:spPr>
+        <p:txBody>
+          <a:bodyPr>
+            <a:normAutofit fontScale="90000"/>
+          </a:bodyPr>
+          <a:lstStyle/>
+          <a:p>
+            <a:r>
+              <a:rPr lang="en-IE" sz="16100" dirty="0">
+                <a:latin typeface="Curlz MT" panose="04040404050702020202" pitchFamily="82" charset="0"/>
+              </a:rPr>
+              <a:t>Monkey Time</a:t>
+            </a:r>
           </a:p>
         </p:txBody>
       </p:sp>
@@ -3383,15 +3508,135 @@
             <p:ph type="subTitle" idx="1"/>
           </p:nvPr>
         </p:nvSpPr>
-        <p:spPr/>
-        <p:txBody>
-          <a:bodyPr/>
-          <a:lstStyle/>
-          <a:p>
-            <a:endParaRPr lang="en-IE"/>
-          </a:p>
-        </p:txBody>
-      </p:sp>
+        <p:spPr>
+          <a:xfrm rot="1862380">
+            <a:off x="10293096" y="5925312"/>
+            <a:ext cx="2033016" cy="679005"/>
+          </a:xfrm>
+        </p:spPr>
+        <p:txBody>
+          <a:bodyPr>
+            <a:normAutofit fontScale="92500" lnSpcReduction="10000"/>
+          </a:bodyPr>
+          <a:lstStyle/>
+          <a:p>
+            <a:r>
+              <a:rPr lang="en-IE" dirty="0">
+                <a:latin typeface="Curlz MT" panose="04040404050702020202" pitchFamily="82" charset="0"/>
+              </a:rPr>
+              <a:t>Kacper and Kleanthis</a:t>
+            </a:r>
+          </a:p>
+        </p:txBody>
+      </p:sp>
+      <p:pic>
+        <p:nvPicPr>
+          <p:cNvPr id="7" name="Picture 6">
+            <a:extLst>
+              <a:ext uri="{FF2B5EF4-FFF2-40B4-BE49-F238E27FC236}">
+                <a16:creationId xmlns:a16="http://schemas.microsoft.com/office/drawing/2014/main" id="{40410FDF-0BD5-41DA-964B-249EF3D3C81D}"/>
+              </a:ext>
+            </a:extLst>
+          </p:cNvPr>
+          <p:cNvPicPr>
+            <a:picLocks noChangeAspect="1"/>
+          </p:cNvPicPr>
+          <p:nvPr/>
+        </p:nvPicPr>
+        <p:blipFill>
+          <a:blip r:embed="rId5">
+            <a:extLst>
+              <a:ext uri="{28A0092B-C50C-407E-A947-70E740481C1C}">
+                <a14:useLocalDpi xmlns:a14="http://schemas.microsoft.com/office/drawing/2010/main" val="0"/>
+              </a:ext>
+            </a:extLst>
+          </a:blip>
+          <a:stretch>
+            <a:fillRect/>
+          </a:stretch>
+        </p:blipFill>
+        <p:spPr>
+          <a:xfrm rot="21353693">
+            <a:off x="438280" y="2705983"/>
+            <a:ext cx="2122002" cy="1619796"/>
+          </a:xfrm>
+          <a:prstGeom prst="rect">
+            <a:avLst/>
+          </a:prstGeom>
+        </p:spPr>
+      </p:pic>
+      <p:pic>
+        <p:nvPicPr>
+          <p:cNvPr id="11" name="Picture 10">
+            <a:extLst>
+              <a:ext uri="{FF2B5EF4-FFF2-40B4-BE49-F238E27FC236}">
+                <a16:creationId xmlns:a16="http://schemas.microsoft.com/office/drawing/2014/main" id="{9CE57EC0-2D0C-4807-BB65-C14A658587CE}"/>
+              </a:ext>
+            </a:extLst>
+          </p:cNvPr>
+          <p:cNvPicPr>
+            <a:picLocks noChangeAspect="1"/>
+          </p:cNvPicPr>
+          <p:nvPr/>
+        </p:nvPicPr>
+        <p:blipFill>
+          <a:blip r:embed="rId6">
+            <a:extLst>
+              <a:ext uri="{28A0092B-C50C-407E-A947-70E740481C1C}">
+                <a14:useLocalDpi xmlns:a14="http://schemas.microsoft.com/office/drawing/2010/main" val="0"/>
+              </a:ext>
+            </a:extLst>
+          </a:blip>
+          <a:stretch>
+            <a:fillRect/>
+          </a:stretch>
+        </p:blipFill>
+        <p:spPr>
+          <a:xfrm rot="21353693">
+            <a:off x="583813" y="4577305"/>
+            <a:ext cx="1819268" cy="1744951"/>
+          </a:xfrm>
+          <a:prstGeom prst="rect">
+            <a:avLst/>
+          </a:prstGeom>
+        </p:spPr>
+      </p:pic>
+      <p:pic>
+        <p:nvPicPr>
+          <p:cNvPr id="20" name="Picture 19">
+            <a:extLst>
+              <a:ext uri="{FF2B5EF4-FFF2-40B4-BE49-F238E27FC236}">
+                <a16:creationId xmlns:a16="http://schemas.microsoft.com/office/drawing/2014/main" id="{4B177B76-A5BB-4327-82A5-7DDDC8D22BBA}"/>
+              </a:ext>
+            </a:extLst>
+          </p:cNvPr>
+          <p:cNvPicPr>
+            <a:picLocks noChangeAspect="1"/>
+          </p:cNvPicPr>
+          <p:nvPr/>
+        </p:nvPicPr>
+        <p:blipFill>
+          <a:blip r:embed="rId7">
+            <a:extLst>
+              <a:ext uri="{28A0092B-C50C-407E-A947-70E740481C1C}">
+                <a14:useLocalDpi xmlns:a14="http://schemas.microsoft.com/office/drawing/2010/main" val="0"/>
+              </a:ext>
+            </a:extLst>
+          </a:blip>
+          <a:stretch>
+            <a:fillRect/>
+          </a:stretch>
+        </p:blipFill>
+        <p:spPr>
+          <a:xfrm rot="1517078">
+            <a:off x="3023760" y="5063319"/>
+            <a:ext cx="1524000" cy="1524000"/>
+          </a:xfrm>
+          <a:prstGeom prst="rect">
+            <a:avLst/>
+          </a:prstGeom>
+        </p:spPr>
+      </p:pic>
     </p:spTree>
     <p:extLst>
       <p:ext uri="{BB962C8B-B14F-4D97-AF65-F5344CB8AC3E}">

</xml_diff>